<commit_message>
rolling future window + loss over future
</commit_message>
<xml_diff>
--- a/Progress/7 Project Progress.pptx
+++ b/Progress/7 Project Progress.pptx
@@ -161,7 +161,7 @@
 <file path=ppt/revisionInfo.xml><?xml version="1.0" encoding="utf-8"?>
 <p1510:revInfo xmlns:a="http://schemas.openxmlformats.org/drawingml/2006/main" xmlns:r="http://schemas.openxmlformats.org/officeDocument/2006/relationships" xmlns:p1510="http://schemas.microsoft.com/office/powerpoint/2015/10/main">
   <p1510:revLst>
-    <p1510:client id="{F52AB931-2634-4E6A-93D6-250A3A6DF052}" v="308" dt="2023-07-04T09:16:37.502"/>
+    <p1510:client id="{F52AB931-2634-4E6A-93D6-250A3A6DF052}" v="338" dt="2023-07-04T09:38:44.591"/>
   </p1510:revLst>
 </p1510:revInfo>
 </file>
@@ -1191,10 +1191,25 @@
   <pc:docChgLst>
     <pc:chgData name="Kyriacos Kyriacou" userId="6a303e1966778a2b" providerId="LiveId" clId="{F52AB931-2634-4E6A-93D6-250A3A6DF052}"/>
     <pc:docChg chg="undo redo custSel addSld delSld modSld">
-      <pc:chgData name="Kyriacos Kyriacou" userId="6a303e1966778a2b" providerId="LiveId" clId="{F52AB931-2634-4E6A-93D6-250A3A6DF052}" dt="2023-07-04T09:24:37.245" v="1840" actId="403"/>
+      <pc:chgData name="Kyriacos Kyriacou" userId="6a303e1966778a2b" providerId="LiveId" clId="{F52AB931-2634-4E6A-93D6-250A3A6DF052}" dt="2023-07-04T09:44:20.188" v="1898" actId="20577"/>
       <pc:docMkLst>
         <pc:docMk/>
       </pc:docMkLst>
+      <pc:sldChg chg="modSp mod">
+        <pc:chgData name="Kyriacos Kyriacou" userId="6a303e1966778a2b" providerId="LiveId" clId="{F52AB931-2634-4E6A-93D6-250A3A6DF052}" dt="2023-07-04T09:44:20.188" v="1898" actId="20577"/>
+        <pc:sldMkLst>
+          <pc:docMk/>
+          <pc:sldMk cId="0" sldId="256"/>
+        </pc:sldMkLst>
+        <pc:spChg chg="mod">
+          <ac:chgData name="Kyriacos Kyriacou" userId="6a303e1966778a2b" providerId="LiveId" clId="{F52AB931-2634-4E6A-93D6-250A3A6DF052}" dt="2023-07-04T09:44:20.188" v="1898" actId="20577"/>
+          <ac:spMkLst>
+            <pc:docMk/>
+            <pc:sldMk cId="0" sldId="256"/>
+            <ac:spMk id="3" creationId="{00000000-0000-0000-0000-000000000000}"/>
+          </ac:spMkLst>
+        </pc:spChg>
+      </pc:sldChg>
       <pc:sldChg chg="del">
         <pc:chgData name="Kyriacos Kyriacou" userId="6a303e1966778a2b" providerId="LiveId" clId="{F52AB931-2634-4E6A-93D6-250A3A6DF052}" dt="2023-07-04T07:37:02.318" v="0" actId="47"/>
         <pc:sldMkLst>
@@ -1224,13 +1239,13 @@
         </pc:sldMkLst>
       </pc:sldChg>
       <pc:sldChg chg="addSp delSp modSp mod">
-        <pc:chgData name="Kyriacos Kyriacou" userId="6a303e1966778a2b" providerId="LiveId" clId="{F52AB931-2634-4E6A-93D6-250A3A6DF052}" dt="2023-07-04T09:21:43.633" v="1833" actId="403"/>
+        <pc:chgData name="Kyriacos Kyriacou" userId="6a303e1966778a2b" providerId="LiveId" clId="{F52AB931-2634-4E6A-93D6-250A3A6DF052}" dt="2023-07-04T09:39:22.536" v="1888" actId="20577"/>
         <pc:sldMkLst>
           <pc:docMk/>
           <pc:sldMk cId="3264051298" sldId="264"/>
         </pc:sldMkLst>
         <pc:spChg chg="mod">
-          <ac:chgData name="Kyriacos Kyriacou" userId="6a303e1966778a2b" providerId="LiveId" clId="{F52AB931-2634-4E6A-93D6-250A3A6DF052}" dt="2023-07-04T09:21:43.633" v="1833" actId="403"/>
+          <ac:chgData name="Kyriacos Kyriacou" userId="6a303e1966778a2b" providerId="LiveId" clId="{F52AB931-2634-4E6A-93D6-250A3A6DF052}" dt="2023-07-04T09:39:22.536" v="1888" actId="20577"/>
           <ac:spMkLst>
             <pc:docMk/>
             <pc:sldMk cId="3264051298" sldId="264"/>
@@ -1369,7 +1384,7 @@
         </pc:sldMkLst>
       </pc:sldChg>
       <pc:sldChg chg="addSp delSp modSp add mod">
-        <pc:chgData name="Kyriacos Kyriacou" userId="6a303e1966778a2b" providerId="LiveId" clId="{F52AB931-2634-4E6A-93D6-250A3A6DF052}" dt="2023-07-04T09:06:59.926" v="1175" actId="20577"/>
+        <pc:chgData name="Kyriacos Kyriacou" userId="6a303e1966778a2b" providerId="LiveId" clId="{F52AB931-2634-4E6A-93D6-250A3A6DF052}" dt="2023-07-04T09:38:44.591" v="1870"/>
         <pc:sldMkLst>
           <pc:docMk/>
           <pc:sldMk cId="2460501861" sldId="272"/>
@@ -1399,7 +1414,7 @@
           </ac:graphicFrameMkLst>
         </pc:graphicFrameChg>
         <pc:graphicFrameChg chg="add mod modGraphic">
-          <ac:chgData name="Kyriacos Kyriacou" userId="6a303e1966778a2b" providerId="LiveId" clId="{F52AB931-2634-4E6A-93D6-250A3A6DF052}" dt="2023-07-04T09:06:59.926" v="1175" actId="20577"/>
+          <ac:chgData name="Kyriacos Kyriacou" userId="6a303e1966778a2b" providerId="LiveId" clId="{F52AB931-2634-4E6A-93D6-250A3A6DF052}" dt="2023-07-04T09:38:44.591" v="1870"/>
           <ac:graphicFrameMkLst>
             <pc:docMk/>
             <pc:sldMk cId="2460501861" sldId="272"/>
@@ -5111,7 +5126,7 @@
             </a:pPr>
             <a:r>
               <a:rPr lang="en-US" sz="2400" dirty="0"/>
-              <a:t>Meeting: 20/06/2023</a:t>
+              <a:t>Meeting: 04/07/2023</a:t>
             </a:r>
           </a:p>
           <a:p>
@@ -6202,7 +6217,7 @@
           <p:nvPr>
             <p:extLst>
               <p:ext uri="{D42A27DB-BD31-4B8C-83A1-F6EECF244321}">
-                <p14:modId xmlns:p14="http://schemas.microsoft.com/office/powerpoint/2010/main" val="1228486889"/>
+                <p14:modId xmlns:p14="http://schemas.microsoft.com/office/powerpoint/2010/main" val="2609575651"/>
               </p:ext>
             </p:extLst>
           </p:nvPr>
@@ -6871,7 +6886,7 @@
                     <a:p>
                       <a:pPr algn="ctr" fontAlgn="base"/>
                       <a:r>
-                        <a:rPr lang="en-GB" sz="1000" baseline="0">
+                        <a:rPr lang="en-GB" sz="1000" baseline="0" dirty="0">
                           <a:effectLst/>
                         </a:rPr>
                         <a:t>0.5226</a:t>
@@ -6977,10 +6992,10 @@
                     <a:p>
                       <a:pPr algn="ctr" fontAlgn="base"/>
                       <a:r>
-                        <a:rPr lang="en-GB" sz="1000" baseline="0">
+                        <a:rPr lang="en-GB" sz="1000" baseline="0" dirty="0">
                           <a:effectLst/>
                         </a:rPr>
-                        <a:t>0.4101</a:t>
+                        <a:t>0.4267</a:t>
                       </a:r>
                     </a:p>
                   </a:txBody>
@@ -7354,6 +7369,9 @@
                       <a:r>
                         <a:rPr lang="en-GB" sz="1000" b="1" baseline="0" dirty="0">
                           <a:effectLst/>
+                          <a:highlight>
+                            <a:srgbClr val="FFFF00"/>
+                          </a:highlight>
                         </a:rPr>
                         <a:t>0.8193</a:t>
                       </a:r>
@@ -7836,7 +7854,7 @@
                         <a:rPr lang="en-GB" sz="1000" baseline="0" dirty="0">
                           <a:effectLst/>
                         </a:rPr>
-                        <a:t>0.4160</a:t>
+                        <a:t>0.4303</a:t>
                       </a:r>
                     </a:p>
                   </a:txBody>
@@ -8261,10 +8279,10 @@
                     <a:p>
                       <a:pPr algn="ctr" fontAlgn="base"/>
                       <a:r>
-                        <a:rPr lang="en-GB" sz="1000" baseline="0">
+                        <a:rPr lang="en-GB" sz="1000" baseline="0" dirty="0">
                           <a:effectLst/>
                         </a:rPr>
-                        <a:t>0.0917</a:t>
+                        <a:t>0.0857</a:t>
                       </a:r>
                     </a:p>
                   </a:txBody>
@@ -8653,6 +8671,9 @@
                       <a:r>
                         <a:rPr lang="en-GB" sz="1000" b="1" baseline="0" dirty="0">
                           <a:effectLst/>
+                          <a:highlight>
+                            <a:srgbClr val="FFFF00"/>
+                          </a:highlight>
                         </a:rPr>
                         <a:t>0.5660</a:t>
                       </a:r>
@@ -8707,7 +8728,7 @@
                         <a:rPr lang="en-GB" sz="1000" baseline="0" dirty="0">
                           <a:effectLst/>
                         </a:rPr>
-                        <a:t>0.4256</a:t>
+                        <a:t>0.4329</a:t>
                       </a:r>
                     </a:p>
                   </a:txBody>
@@ -9135,7 +9156,7 @@
                         <a:rPr lang="en-GB" sz="1000" baseline="0" dirty="0">
                           <a:effectLst/>
                         </a:rPr>
-                        <a:t>0.6833</a:t>
+                        <a:t> 0.6908</a:t>
                       </a:r>
                     </a:p>
                   </a:txBody>
@@ -9509,6 +9530,9 @@
                       <a:r>
                         <a:rPr lang="en-GB" sz="1000" b="1" baseline="0" dirty="0">
                           <a:effectLst/>
+                          <a:highlight>
+                            <a:srgbClr val="FFFF00"/>
+                          </a:highlight>
                         </a:rPr>
                         <a:t>0.5272</a:t>
                       </a:r>
@@ -9563,7 +9587,7 @@
                         <a:rPr lang="en-GB" sz="1000" baseline="0" dirty="0">
                           <a:effectLst/>
                         </a:rPr>
-                        <a:t>0.4319</a:t>
+                        <a:t>0.4349</a:t>
                       </a:r>
                     </a:p>
                   </a:txBody>
@@ -9829,10 +9853,10 @@
                     <a:p>
                       <a:pPr algn="ctr" fontAlgn="base"/>
                       <a:r>
-                        <a:rPr lang="en-GB" sz="1000" baseline="0">
+                        <a:rPr lang="en-GB" sz="1000" baseline="0" dirty="0">
                           <a:effectLst/>
                         </a:rPr>
-                        <a:t>0.1520</a:t>
+                        <a:t>0.1501</a:t>
                       </a:r>
                     </a:p>
                   </a:txBody>
@@ -9937,6 +9961,9 @@
                       <a:r>
                         <a:rPr lang="en-GB" sz="1000" b="1" baseline="0" dirty="0">
                           <a:effectLst/>
+                          <a:highlight>
+                            <a:srgbClr val="FFFF00"/>
+                          </a:highlight>
                         </a:rPr>
                         <a:t>0.1509</a:t>
                       </a:r>
@@ -9988,10 +10015,10 @@
                     <a:p>
                       <a:pPr algn="ctr" fontAlgn="base"/>
                       <a:r>
-                        <a:rPr lang="en-GB" sz="1000" baseline="0">
+                        <a:rPr lang="en-GB" sz="1000" baseline="0" dirty="0">
                           <a:effectLst/>
                         </a:rPr>
-                        <a:t>0.0888</a:t>
+                        <a:t>0.0895</a:t>
                       </a:r>
                     </a:p>
                   </a:txBody>
@@ -10304,7 +10331,7 @@
               <a:rPr lang="en-GB" sz="2000" dirty="0">
                 <a:latin typeface="Söhne"/>
               </a:rPr>
-              <a:t>Autoregressive models but not rolling window:</a:t>
+              <a:t>Autoregressive models:</a:t>
             </a:r>
           </a:p>
           <a:p>

</xml_diff>